<commit_message>
Added React pages and components. Refactored the studentRoute and the teacherRoute into a single personRoute. Had the Reach client hit the nodes server.
</commit_message>
<xml_diff>
--- a/tempConversion.pptx
+++ b/tempConversion.pptx
@@ -3436,7 +3436,7 @@
           <a:p>
             <a:r>
               <a:rPr lang="en-US" sz="1100" dirty="0"/>
-              <a:t>Add a Teacher</a:t>
+              <a:t>Add a Teacher (last, first)</a:t>
             </a:r>
           </a:p>
         </p:txBody>
@@ -3495,8 +3495,13 @@
           <a:p>
             <a:r>
               <a:rPr lang="en-US" sz="1100" dirty="0"/>
-              <a:t>Add a Student</a:t>
-            </a:r>
+              <a:t>Add </a:t>
+            </a:r>
+            <a:r>
+              <a:rPr lang="en-US" sz="1100"/>
+              <a:t>a Student (last, first)</a:t>
+            </a:r>
+            <a:endParaRPr lang="en-US" sz="1100" dirty="0"/>
           </a:p>
         </p:txBody>
       </p:sp>

</xml_diff>